<commit_message>
further investigation for proper elastic line location using TOF data
</commit_message>
<xml_diff>
--- a/Data/sources/reduction/Mantid_nxspe_2024/cycle06_05/EiAndElasticLineForRuns.pptx
+++ b/Data/sources/reduction/Mantid_nxspe_2024/cycle06_05/EiAndElasticLineForRuns.pptx
@@ -263,7 +263,7 @@
           <a:p>
             <a:fld id="{D1721A36-19D5-4488-87C2-536213FC39A1}" type="datetimeFigureOut">
               <a:rPr lang="en-GB" smtClean="0"/>
-              <a:t>16/09/2024</a:t>
+              <a:t>17/09/2024</a:t>
             </a:fld>
             <a:endParaRPr lang="en-GB"/>
           </a:p>
@@ -463,7 +463,7 @@
           <a:p>
             <a:fld id="{D1721A36-19D5-4488-87C2-536213FC39A1}" type="datetimeFigureOut">
               <a:rPr lang="en-GB" smtClean="0"/>
-              <a:t>16/09/2024</a:t>
+              <a:t>17/09/2024</a:t>
             </a:fld>
             <a:endParaRPr lang="en-GB"/>
           </a:p>
@@ -673,7 +673,7 @@
           <a:p>
             <a:fld id="{D1721A36-19D5-4488-87C2-536213FC39A1}" type="datetimeFigureOut">
               <a:rPr lang="en-GB" smtClean="0"/>
-              <a:t>16/09/2024</a:t>
+              <a:t>17/09/2024</a:t>
             </a:fld>
             <a:endParaRPr lang="en-GB"/>
           </a:p>
@@ -873,7 +873,7 @@
           <a:p>
             <a:fld id="{D1721A36-19D5-4488-87C2-536213FC39A1}" type="datetimeFigureOut">
               <a:rPr lang="en-GB" smtClean="0"/>
-              <a:t>16/09/2024</a:t>
+              <a:t>17/09/2024</a:t>
             </a:fld>
             <a:endParaRPr lang="en-GB"/>
           </a:p>
@@ -1149,7 +1149,7 @@
           <a:p>
             <a:fld id="{D1721A36-19D5-4488-87C2-536213FC39A1}" type="datetimeFigureOut">
               <a:rPr lang="en-GB" smtClean="0"/>
-              <a:t>16/09/2024</a:t>
+              <a:t>17/09/2024</a:t>
             </a:fld>
             <a:endParaRPr lang="en-GB"/>
           </a:p>
@@ -1417,7 +1417,7 @@
           <a:p>
             <a:fld id="{D1721A36-19D5-4488-87C2-536213FC39A1}" type="datetimeFigureOut">
               <a:rPr lang="en-GB" smtClean="0"/>
-              <a:t>16/09/2024</a:t>
+              <a:t>17/09/2024</a:t>
             </a:fld>
             <a:endParaRPr lang="en-GB"/>
           </a:p>
@@ -1832,7 +1832,7 @@
           <a:p>
             <a:fld id="{D1721A36-19D5-4488-87C2-536213FC39A1}" type="datetimeFigureOut">
               <a:rPr lang="en-GB" smtClean="0"/>
-              <a:t>16/09/2024</a:t>
+              <a:t>17/09/2024</a:t>
             </a:fld>
             <a:endParaRPr lang="en-GB"/>
           </a:p>
@@ -1974,7 +1974,7 @@
           <a:p>
             <a:fld id="{D1721A36-19D5-4488-87C2-536213FC39A1}" type="datetimeFigureOut">
               <a:rPr lang="en-GB" smtClean="0"/>
-              <a:t>16/09/2024</a:t>
+              <a:t>17/09/2024</a:t>
             </a:fld>
             <a:endParaRPr lang="en-GB"/>
           </a:p>
@@ -2087,7 +2087,7 @@
           <a:p>
             <a:fld id="{D1721A36-19D5-4488-87C2-536213FC39A1}" type="datetimeFigureOut">
               <a:rPr lang="en-GB" smtClean="0"/>
-              <a:t>16/09/2024</a:t>
+              <a:t>17/09/2024</a:t>
             </a:fld>
             <a:endParaRPr lang="en-GB"/>
           </a:p>
@@ -2400,7 +2400,7 @@
           <a:p>
             <a:fld id="{D1721A36-19D5-4488-87C2-536213FC39A1}" type="datetimeFigureOut">
               <a:rPr lang="en-GB" smtClean="0"/>
-              <a:t>16/09/2024</a:t>
+              <a:t>17/09/2024</a:t>
             </a:fld>
             <a:endParaRPr lang="en-GB"/>
           </a:p>
@@ -2689,7 +2689,7 @@
           <a:p>
             <a:fld id="{D1721A36-19D5-4488-87C2-536213FC39A1}" type="datetimeFigureOut">
               <a:rPr lang="en-GB" smtClean="0"/>
-              <a:t>16/09/2024</a:t>
+              <a:t>17/09/2024</a:t>
             </a:fld>
             <a:endParaRPr lang="en-GB"/>
           </a:p>
@@ -2932,7 +2932,7 @@
           <a:p>
             <a:fld id="{D1721A36-19D5-4488-87C2-536213FC39A1}" type="datetimeFigureOut">
               <a:rPr lang="en-GB" smtClean="0"/>
-              <a:t>16/09/2024</a:t>
+              <a:t>17/09/2024</a:t>
             </a:fld>
             <a:endParaRPr lang="en-GB"/>
           </a:p>
@@ -3774,10 +3774,10 @@
       </p:grpSpPr>
       <p:pic>
         <p:nvPicPr>
-          <p:cNvPr id="20" name="Picture 19" descr="A graph of energy transfer&#10;&#10;Description automatically generated">
-            <a:extLst>
-              <a:ext uri="{FF2B5EF4-FFF2-40B4-BE49-F238E27FC236}">
-                <a16:creationId xmlns:a16="http://schemas.microsoft.com/office/drawing/2014/main" id="{5B353C7D-6FB0-F72F-4671-A4E81EFE756D}"/>
+          <p:cNvPr id="7" name="Picture 6" descr="A screen shot of a graph&#10;&#10;Description automatically generated">
+            <a:extLst>
+              <a:ext uri="{FF2B5EF4-FFF2-40B4-BE49-F238E27FC236}">
+                <a16:creationId xmlns:a16="http://schemas.microsoft.com/office/drawing/2014/main" id="{1EADB5E9-756E-CF5F-F285-D3C8DFFE6341}"/>
               </a:ext>
             </a:extLst>
           </p:cNvPr>
@@ -3788,6 +3788,42 @@
         </p:nvPicPr>
         <p:blipFill>
           <a:blip r:embed="rId2">
+            <a:extLst>
+              <a:ext uri="{28A0092B-C50C-407E-A947-70E740481C1C}">
+                <a14:useLocalDpi xmlns:a14="http://schemas.microsoft.com/office/drawing/2010/main" val="0"/>
+              </a:ext>
+            </a:extLst>
+          </a:blip>
+          <a:stretch>
+            <a:fillRect/>
+          </a:stretch>
+        </p:blipFill>
+        <p:spPr>
+          <a:xfrm>
+            <a:off x="905750" y="1491292"/>
+            <a:ext cx="3894084" cy="3386463"/>
+          </a:xfrm>
+          <a:prstGeom prst="rect">
+            <a:avLst/>
+          </a:prstGeom>
+        </p:spPr>
+      </p:pic>
+      <p:pic>
+        <p:nvPicPr>
+          <p:cNvPr id="20" name="Picture 19" descr="A graph of energy transfer&#10;&#10;Description automatically generated">
+            <a:extLst>
+              <a:ext uri="{FF2B5EF4-FFF2-40B4-BE49-F238E27FC236}">
+                <a16:creationId xmlns:a16="http://schemas.microsoft.com/office/drawing/2014/main" id="{5B353C7D-6FB0-F72F-4671-A4E81EFE756D}"/>
+              </a:ext>
+            </a:extLst>
+          </p:cNvPr>
+          <p:cNvPicPr>
+            <a:picLocks noChangeAspect="1"/>
+          </p:cNvPicPr>
+          <p:nvPr/>
+        </p:nvPicPr>
+        <p:blipFill>
+          <a:blip r:embed="rId3">
             <a:extLst>
               <a:ext uri="{28A0092B-C50C-407E-A947-70E740481C1C}">
                 <a14:useLocalDpi xmlns:a14="http://schemas.microsoft.com/office/drawing/2010/main" val="0"/>
@@ -3928,13 +3964,15 @@
               </a:ext>
             </a:extLst>
           </p:cNvPr>
-          <p:cNvCxnSpPr/>
+          <p:cNvCxnSpPr>
+            <a:cxnSpLocks/>
+          </p:cNvCxnSpPr>
           <p:nvPr/>
         </p:nvCxnSpPr>
         <p:spPr>
           <a:xfrm flipV="1">
-            <a:off x="668095" y="1791655"/>
-            <a:ext cx="52754" cy="3086100"/>
+            <a:off x="1611856" y="1606989"/>
+            <a:ext cx="49164" cy="3041097"/>
           </a:xfrm>
           <a:prstGeom prst="line">
             <a:avLst/>
@@ -4048,42 +4086,6 @@
           </a:p>
         </p:txBody>
       </p:sp>
-      <p:pic>
-        <p:nvPicPr>
-          <p:cNvPr id="7" name="Picture 6" descr="A screen shot of a graph&#10;&#10;Description automatically generated">
-            <a:extLst>
-              <a:ext uri="{FF2B5EF4-FFF2-40B4-BE49-F238E27FC236}">
-                <a16:creationId xmlns:a16="http://schemas.microsoft.com/office/drawing/2014/main" id="{1EADB5E9-756E-CF5F-F285-D3C8DFFE6341}"/>
-              </a:ext>
-            </a:extLst>
-          </p:cNvPr>
-          <p:cNvPicPr>
-            <a:picLocks noChangeAspect="1"/>
-          </p:cNvPicPr>
-          <p:nvPr/>
-        </p:nvPicPr>
-        <p:blipFill>
-          <a:blip r:embed="rId3">
-            <a:extLst>
-              <a:ext uri="{28A0092B-C50C-407E-A947-70E740481C1C}">
-                <a14:useLocalDpi xmlns:a14="http://schemas.microsoft.com/office/drawing/2010/main" val="0"/>
-              </a:ext>
-            </a:extLst>
-          </a:blip>
-          <a:stretch>
-            <a:fillRect/>
-          </a:stretch>
-        </p:blipFill>
-        <p:spPr>
-          <a:xfrm>
-            <a:off x="905750" y="1491292"/>
-            <a:ext cx="3894084" cy="3386463"/>
-          </a:xfrm>
-          <a:prstGeom prst="rect">
-            <a:avLst/>
-          </a:prstGeom>
-        </p:spPr>
-      </p:pic>
       <p:pic>
         <p:nvPicPr>
           <p:cNvPr id="13" name="Picture 12" descr="A graph of energy transfer&#10;&#10;Description automatically generated">

</xml_diff>

<commit_message>
modified reduction scripts and run description wrt the new Ei estimate
</commit_message>
<xml_diff>
--- a/Data/sources/reduction/Mantid_nxspe_2024/cycle06_05/EiAndElasticLineForRuns.pptx
+++ b/Data/sources/reduction/Mantid_nxspe_2024/cycle06_05/EiAndElasticLineForRuns.pptx
@@ -7,7 +7,8 @@
   <p:sldIdLst>
     <p:sldId id="258" r:id="rId2"/>
     <p:sldId id="256" r:id="rId3"/>
-    <p:sldId id="257" r:id="rId4"/>
+    <p:sldId id="259" r:id="rId4"/>
+    <p:sldId id="257" r:id="rId5"/>
   </p:sldIdLst>
   <p:sldSz cx="12192000" cy="6858000"/>
   <p:notesSz cx="6858000" cy="9144000"/>
@@ -263,7 +264,7 @@
           <a:p>
             <a:fld id="{D1721A36-19D5-4488-87C2-536213FC39A1}" type="datetimeFigureOut">
               <a:rPr lang="en-GB" smtClean="0"/>
-              <a:t>17/09/2024</a:t>
+              <a:t>18/09/2024</a:t>
             </a:fld>
             <a:endParaRPr lang="en-GB"/>
           </a:p>
@@ -463,7 +464,7 @@
           <a:p>
             <a:fld id="{D1721A36-19D5-4488-87C2-536213FC39A1}" type="datetimeFigureOut">
               <a:rPr lang="en-GB" smtClean="0"/>
-              <a:t>17/09/2024</a:t>
+              <a:t>18/09/2024</a:t>
             </a:fld>
             <a:endParaRPr lang="en-GB"/>
           </a:p>
@@ -673,7 +674,7 @@
           <a:p>
             <a:fld id="{D1721A36-19D5-4488-87C2-536213FC39A1}" type="datetimeFigureOut">
               <a:rPr lang="en-GB" smtClean="0"/>
-              <a:t>17/09/2024</a:t>
+              <a:t>18/09/2024</a:t>
             </a:fld>
             <a:endParaRPr lang="en-GB"/>
           </a:p>
@@ -873,7 +874,7 @@
           <a:p>
             <a:fld id="{D1721A36-19D5-4488-87C2-536213FC39A1}" type="datetimeFigureOut">
               <a:rPr lang="en-GB" smtClean="0"/>
-              <a:t>17/09/2024</a:t>
+              <a:t>18/09/2024</a:t>
             </a:fld>
             <a:endParaRPr lang="en-GB"/>
           </a:p>
@@ -1149,7 +1150,7 @@
           <a:p>
             <a:fld id="{D1721A36-19D5-4488-87C2-536213FC39A1}" type="datetimeFigureOut">
               <a:rPr lang="en-GB" smtClean="0"/>
-              <a:t>17/09/2024</a:t>
+              <a:t>18/09/2024</a:t>
             </a:fld>
             <a:endParaRPr lang="en-GB"/>
           </a:p>
@@ -1417,7 +1418,7 @@
           <a:p>
             <a:fld id="{D1721A36-19D5-4488-87C2-536213FC39A1}" type="datetimeFigureOut">
               <a:rPr lang="en-GB" smtClean="0"/>
-              <a:t>17/09/2024</a:t>
+              <a:t>18/09/2024</a:t>
             </a:fld>
             <a:endParaRPr lang="en-GB"/>
           </a:p>
@@ -1832,7 +1833,7 @@
           <a:p>
             <a:fld id="{D1721A36-19D5-4488-87C2-536213FC39A1}" type="datetimeFigureOut">
               <a:rPr lang="en-GB" smtClean="0"/>
-              <a:t>17/09/2024</a:t>
+              <a:t>18/09/2024</a:t>
             </a:fld>
             <a:endParaRPr lang="en-GB"/>
           </a:p>
@@ -1974,7 +1975,7 @@
           <a:p>
             <a:fld id="{D1721A36-19D5-4488-87C2-536213FC39A1}" type="datetimeFigureOut">
               <a:rPr lang="en-GB" smtClean="0"/>
-              <a:t>17/09/2024</a:t>
+              <a:t>18/09/2024</a:t>
             </a:fld>
             <a:endParaRPr lang="en-GB"/>
           </a:p>
@@ -2087,7 +2088,7 @@
           <a:p>
             <a:fld id="{D1721A36-19D5-4488-87C2-536213FC39A1}" type="datetimeFigureOut">
               <a:rPr lang="en-GB" smtClean="0"/>
-              <a:t>17/09/2024</a:t>
+              <a:t>18/09/2024</a:t>
             </a:fld>
             <a:endParaRPr lang="en-GB"/>
           </a:p>
@@ -2400,7 +2401,7 @@
           <a:p>
             <a:fld id="{D1721A36-19D5-4488-87C2-536213FC39A1}" type="datetimeFigureOut">
               <a:rPr lang="en-GB" smtClean="0"/>
-              <a:t>17/09/2024</a:t>
+              <a:t>18/09/2024</a:t>
             </a:fld>
             <a:endParaRPr lang="en-GB"/>
           </a:p>
@@ -2689,7 +2690,7 @@
           <a:p>
             <a:fld id="{D1721A36-19D5-4488-87C2-536213FC39A1}" type="datetimeFigureOut">
               <a:rPr lang="en-GB" smtClean="0"/>
-              <a:t>17/09/2024</a:t>
+              <a:t>18/09/2024</a:t>
             </a:fld>
             <a:endParaRPr lang="en-GB"/>
           </a:p>
@@ -2932,7 +2933,7 @@
           <a:p>
             <a:fld id="{D1721A36-19D5-4488-87C2-536213FC39A1}" type="datetimeFigureOut">
               <a:rPr lang="en-GB" smtClean="0"/>
-              <a:t>17/09/2024</a:t>
+              <a:t>18/09/2024</a:t>
             </a:fld>
             <a:endParaRPr lang="en-GB"/>
           </a:p>
@@ -3950,7 +3951,7 @@
           <a:p>
             <a:r>
               <a:rPr lang="en-GB" dirty="0"/>
-              <a:t>Binning range 720meV</a:t>
+              <a:t>Binning range 726meV</a:t>
             </a:r>
           </a:p>
         </p:txBody>
@@ -4013,7 +4014,7 @@
         <p:spPr>
           <a:xfrm>
             <a:off x="1429421" y="6171971"/>
-            <a:ext cx="2664512" cy="369332"/>
+            <a:ext cx="3576813" cy="369332"/>
           </a:xfrm>
           <a:prstGeom prst="rect">
             <a:avLst/>
@@ -4045,9 +4046,10 @@
               <a:t>i</a:t>
             </a:r>
             <a:r>
-              <a:rPr lang="en-GB" dirty="0"/>
-              <a:t> = 1.16</a:t>
-            </a:r>
+              <a:rPr lang="en-GB"/>
+              <a:t> =7.6  Phonons?</a:t>
+            </a:r>
+            <a:endParaRPr lang="en-GB" dirty="0"/>
           </a:p>
         </p:txBody>
       </p:sp>
@@ -4066,7 +4068,7 @@
         <p:spPr>
           <a:xfrm>
             <a:off x="1019262" y="792760"/>
-            <a:ext cx="3206775" cy="369332"/>
+            <a:ext cx="6576096" cy="369332"/>
           </a:xfrm>
           <a:prstGeom prst="rect">
             <a:avLst/>
@@ -4081,7 +4083,7 @@
           <a:p>
             <a:r>
               <a:rPr lang="en-GB" dirty="0"/>
-              <a:t>Chopper peak around 800meV</a:t>
+              <a:t>Chopper peak around 800meV. Doing Ei on Vanadium elastic line.</a:t>
             </a:r>
           </a:p>
         </p:txBody>
@@ -4184,10 +4186,10 @@
       </p:grpSpPr>
       <p:pic>
         <p:nvPicPr>
-          <p:cNvPr id="3" name="Picture 2">
-            <a:extLst>
-              <a:ext uri="{FF2B5EF4-FFF2-40B4-BE49-F238E27FC236}">
-                <a16:creationId xmlns:a16="http://schemas.microsoft.com/office/drawing/2014/main" id="{DFFE3A5A-55AC-795A-E9A3-6D4968B727C0}"/>
+          <p:cNvPr id="11" name="Picture 10">
+            <a:extLst>
+              <a:ext uri="{FF2B5EF4-FFF2-40B4-BE49-F238E27FC236}">
+                <a16:creationId xmlns:a16="http://schemas.microsoft.com/office/drawing/2014/main" id="{7D9CCA90-A229-3A53-D501-72CA7ADDA4F9}"/>
               </a:ext>
             </a:extLst>
           </p:cNvPr>
@@ -4204,20 +4206,50 @@
         </p:blipFill>
         <p:spPr>
           <a:xfrm>
-            <a:off x="7174593" y="1840712"/>
-            <a:ext cx="3204275" cy="2798400"/>
+            <a:off x="6457712" y="1254109"/>
+            <a:ext cx="2925980" cy="2174891"/>
           </a:xfrm>
           <a:prstGeom prst="rect">
             <a:avLst/>
           </a:prstGeom>
         </p:spPr>
       </p:pic>
-      <p:sp>
-        <p:nvSpPr>
-          <p:cNvPr id="4" name="TextBox 3">
-            <a:extLst>
-              <a:ext uri="{FF2B5EF4-FFF2-40B4-BE49-F238E27FC236}">
-                <a16:creationId xmlns:a16="http://schemas.microsoft.com/office/drawing/2014/main" id="{403CB135-BC5D-F8C1-527C-52F21DE2923C}"/>
+      <p:pic>
+        <p:nvPicPr>
+          <p:cNvPr id="5" name="Picture 4">
+            <a:extLst>
+              <a:ext uri="{FF2B5EF4-FFF2-40B4-BE49-F238E27FC236}">
+                <a16:creationId xmlns:a16="http://schemas.microsoft.com/office/drawing/2014/main" id="{8B91180B-B34E-A7D0-2009-661070CD82BD}"/>
+              </a:ext>
+            </a:extLst>
+          </p:cNvPr>
+          <p:cNvPicPr>
+            <a:picLocks noChangeAspect="1"/>
+          </p:cNvPicPr>
+          <p:nvPr/>
+        </p:nvPicPr>
+        <p:blipFill>
+          <a:blip r:embed="rId3"/>
+          <a:stretch>
+            <a:fillRect/>
+          </a:stretch>
+        </p:blipFill>
+        <p:spPr>
+          <a:xfrm>
+            <a:off x="1125609" y="1336578"/>
+            <a:ext cx="4118836" cy="3581917"/>
+          </a:xfrm>
+          <a:prstGeom prst="rect">
+            <a:avLst/>
+          </a:prstGeom>
+        </p:spPr>
+      </p:pic>
+      <p:sp>
+        <p:nvSpPr>
+          <p:cNvPr id="2" name="TextBox 1">
+            <a:extLst>
+              <a:ext uri="{FF2B5EF4-FFF2-40B4-BE49-F238E27FC236}">
+                <a16:creationId xmlns:a16="http://schemas.microsoft.com/office/drawing/2014/main" id="{14B87E17-0876-1EED-77D1-D1D03F27BEE5}"/>
               </a:ext>
             </a:extLst>
           </p:cNvPr>
@@ -4226,8 +4258,8 @@
         </p:nvSpPr>
         <p:spPr>
           <a:xfrm>
-            <a:off x="1019262" y="792760"/>
-            <a:ext cx="7123745" cy="369332"/>
+            <a:off x="809538" y="213919"/>
+            <a:ext cx="6284284" cy="369332"/>
           </a:xfrm>
           <a:prstGeom prst="rect">
             <a:avLst/>
@@ -4242,29 +4274,30 @@
           <a:p>
             <a:r>
               <a:rPr lang="en-GB" dirty="0"/>
-              <a:t>Chopper peak around 200meV. Histogram mode, poor energy accuracy</a:t>
+              <a:t>Validate correct incident energy using Vanadium run N120270</a:t>
             </a:r>
           </a:p>
         </p:txBody>
       </p:sp>
       <p:cxnSp>
         <p:nvCxnSpPr>
-          <p:cNvPr id="11" name="Straight Arrow Connector 10">
-            <a:extLst>
-              <a:ext uri="{FF2B5EF4-FFF2-40B4-BE49-F238E27FC236}">
-                <a16:creationId xmlns:a16="http://schemas.microsoft.com/office/drawing/2014/main" id="{7E5A7F3C-8C8D-B22E-ECC0-B2374B4CA32B}"/>
+          <p:cNvPr id="8" name="Straight Arrow Connector 7">
+            <a:extLst>
+              <a:ext uri="{FF2B5EF4-FFF2-40B4-BE49-F238E27FC236}">
+                <a16:creationId xmlns:a16="http://schemas.microsoft.com/office/drawing/2014/main" id="{0A271F89-F35A-50C0-14C2-8515C59545BA}"/>
               </a:ext>
             </a:extLst>
           </p:cNvPr>
           <p:cNvCxnSpPr>
             <a:cxnSpLocks/>
+            <a:stCxn id="9" idx="2"/>
           </p:cNvCxnSpPr>
           <p:nvPr/>
         </p:nvCxnSpPr>
         <p:spPr>
           <a:xfrm>
-            <a:off x="8882104" y="3299869"/>
-            <a:ext cx="907848" cy="798153"/>
+            <a:off x="8572356" y="2530319"/>
+            <a:ext cx="462986" cy="520035"/>
           </a:xfrm>
           <a:prstGeom prst="straightConnector1">
             <a:avLst/>
@@ -4290,10 +4323,10 @@
       </p:cxnSp>
       <p:sp>
         <p:nvSpPr>
-          <p:cNvPr id="12" name="TextBox 11">
-            <a:extLst>
-              <a:ext uri="{FF2B5EF4-FFF2-40B4-BE49-F238E27FC236}">
-                <a16:creationId xmlns:a16="http://schemas.microsoft.com/office/drawing/2014/main" id="{2257902C-FF66-37F0-4D53-379533B7347A}"/>
+          <p:cNvPr id="9" name="TextBox 8">
+            <a:extLst>
+              <a:ext uri="{FF2B5EF4-FFF2-40B4-BE49-F238E27FC236}">
+                <a16:creationId xmlns:a16="http://schemas.microsoft.com/office/drawing/2014/main" id="{1B875A66-02C2-977F-CD26-B43D8047BEB0}"/>
               </a:ext>
             </a:extLst>
           </p:cNvPr>
@@ -4302,8 +4335,8 @@
         </p:nvSpPr>
         <p:spPr>
           <a:xfrm>
-            <a:off x="7652638" y="2962504"/>
-            <a:ext cx="2431948" cy="369332"/>
+            <a:off x="6727972" y="1606989"/>
+            <a:ext cx="3688767" cy="923330"/>
           </a:xfrm>
           <a:prstGeom prst="rect">
             <a:avLst/>
@@ -4318,7 +4351,381 @@
           <a:p>
             <a:r>
               <a:rPr lang="en-GB" dirty="0"/>
-              <a:t>Binning range 162 </a:t>
+              <a:t>Binning range 720meV from sample</a:t>
+            </a:r>
+          </a:p>
+          <a:p>
+            <a:r>
+              <a:rPr lang="en-GB" dirty="0"/>
+              <a:t>As sample has strong phonons,</a:t>
+            </a:r>
+          </a:p>
+          <a:p>
+            <a:r>
+              <a:rPr lang="en-GB" dirty="0"/>
+              <a:t> Vanadium may work up to 726</a:t>
+            </a:r>
+          </a:p>
+        </p:txBody>
+      </p:sp>
+      <p:cxnSp>
+        <p:nvCxnSpPr>
+          <p:cNvPr id="14" name="Straight Connector 13">
+            <a:extLst>
+              <a:ext uri="{FF2B5EF4-FFF2-40B4-BE49-F238E27FC236}">
+                <a16:creationId xmlns:a16="http://schemas.microsoft.com/office/drawing/2014/main" id="{27473EB1-1746-B2B3-14A7-451D810BF5C7}"/>
+              </a:ext>
+            </a:extLst>
+          </p:cNvPr>
+          <p:cNvCxnSpPr>
+            <a:cxnSpLocks/>
+          </p:cNvCxnSpPr>
+          <p:nvPr/>
+        </p:nvCxnSpPr>
+        <p:spPr>
+          <a:xfrm flipV="1">
+            <a:off x="1611856" y="1452623"/>
+            <a:ext cx="54898" cy="3195463"/>
+          </a:xfrm>
+          <a:prstGeom prst="line">
+            <a:avLst/>
+          </a:prstGeom>
+          <a:ln>
+            <a:solidFill>
+              <a:srgbClr val="FF0000"/>
+            </a:solidFill>
+          </a:ln>
+        </p:spPr>
+        <p:style>
+          <a:lnRef idx="2">
+            <a:schemeClr val="accent1"/>
+          </a:lnRef>
+          <a:fillRef idx="0">
+            <a:schemeClr val="accent1"/>
+          </a:fillRef>
+          <a:effectRef idx="1">
+            <a:schemeClr val="accent1"/>
+          </a:effectRef>
+          <a:fontRef idx="minor">
+            <a:schemeClr val="tx1"/>
+          </a:fontRef>
+        </p:style>
+      </p:cxnSp>
+      <p:sp>
+        <p:nvSpPr>
+          <p:cNvPr id="17" name="TextBox 16">
+            <a:extLst>
+              <a:ext uri="{FF2B5EF4-FFF2-40B4-BE49-F238E27FC236}">
+                <a16:creationId xmlns:a16="http://schemas.microsoft.com/office/drawing/2014/main" id="{44B963C4-191B-D1E7-23E4-B97CD8A2E1CD}"/>
+              </a:ext>
+            </a:extLst>
+          </p:cNvPr>
+          <p:cNvSpPr txBox="1"/>
+          <p:nvPr/>
+        </p:nvSpPr>
+        <p:spPr>
+          <a:xfrm>
+            <a:off x="1429421" y="6171971"/>
+            <a:ext cx="2573140" cy="369332"/>
+          </a:xfrm>
+          <a:prstGeom prst="rect">
+            <a:avLst/>
+          </a:prstGeom>
+          <a:noFill/>
+        </p:spPr>
+        <p:txBody>
+          <a:bodyPr wrap="none" rtlCol="0">
+            <a:spAutoFit/>
+          </a:bodyPr>
+          <a:lstStyle/>
+          <a:p>
+            <a:r>
+              <a:rPr lang="en-GB" dirty="0"/>
+              <a:t>When Ei = 785, </a:t>
+            </a:r>
+            <a:r>
+              <a:rPr lang="en-GB" dirty="0" err="1">
+                <a:latin typeface="Symbol" panose="05050102010706020507" pitchFamily="18" charset="2"/>
+              </a:rPr>
+              <a:t>D</a:t>
+            </a:r>
+            <a:r>
+              <a:rPr lang="en-GB" dirty="0" err="1"/>
+              <a:t>E</a:t>
+            </a:r>
+            <a:r>
+              <a:rPr lang="en-GB" sz="1600" dirty="0" err="1"/>
+              <a:t>i</a:t>
+            </a:r>
+            <a:r>
+              <a:rPr lang="en-GB" dirty="0"/>
+              <a:t> =-0.3</a:t>
+            </a:r>
+          </a:p>
+        </p:txBody>
+      </p:sp>
+      <p:sp>
+        <p:nvSpPr>
+          <p:cNvPr id="3" name="TextBox 2">
+            <a:extLst>
+              <a:ext uri="{FF2B5EF4-FFF2-40B4-BE49-F238E27FC236}">
+                <a16:creationId xmlns:a16="http://schemas.microsoft.com/office/drawing/2014/main" id="{4D4B6C63-672B-1921-AA7E-8A5205EFDBA1}"/>
+              </a:ext>
+            </a:extLst>
+          </p:cNvPr>
+          <p:cNvSpPr txBox="1"/>
+          <p:nvPr/>
+        </p:nvSpPr>
+        <p:spPr>
+          <a:xfrm>
+            <a:off x="1019262" y="792760"/>
+            <a:ext cx="3312766" cy="369332"/>
+          </a:xfrm>
+          <a:prstGeom prst="rect">
+            <a:avLst/>
+          </a:prstGeom>
+          <a:noFill/>
+        </p:spPr>
+        <p:txBody>
+          <a:bodyPr wrap="none" rtlCol="0">
+            <a:spAutoFit/>
+          </a:bodyPr>
+          <a:lstStyle/>
+          <a:p>
+            <a:r>
+              <a:rPr lang="en-GB" dirty="0"/>
+              <a:t>Chopper peak around 800meV..</a:t>
+            </a:r>
+          </a:p>
+        </p:txBody>
+      </p:sp>
+      <p:pic>
+        <p:nvPicPr>
+          <p:cNvPr id="18" name="Picture 17">
+            <a:extLst>
+              <a:ext uri="{FF2B5EF4-FFF2-40B4-BE49-F238E27FC236}">
+                <a16:creationId xmlns:a16="http://schemas.microsoft.com/office/drawing/2014/main" id="{E7020E8F-DA06-EC47-BF31-D483553306F9}"/>
+              </a:ext>
+            </a:extLst>
+          </p:cNvPr>
+          <p:cNvPicPr>
+            <a:picLocks noChangeAspect="1"/>
+          </p:cNvPicPr>
+          <p:nvPr/>
+        </p:nvPicPr>
+        <p:blipFill>
+          <a:blip r:embed="rId4"/>
+          <a:stretch>
+            <a:fillRect/>
+          </a:stretch>
+        </p:blipFill>
+        <p:spPr>
+          <a:xfrm>
+            <a:off x="6030461" y="6008974"/>
+            <a:ext cx="2857500" cy="695325"/>
+          </a:xfrm>
+          <a:prstGeom prst="rect">
+            <a:avLst/>
+          </a:prstGeom>
+        </p:spPr>
+      </p:pic>
+      <p:pic>
+        <p:nvPicPr>
+          <p:cNvPr id="21" name="Picture 20">
+            <a:extLst>
+              <a:ext uri="{FF2B5EF4-FFF2-40B4-BE49-F238E27FC236}">
+                <a16:creationId xmlns:a16="http://schemas.microsoft.com/office/drawing/2014/main" id="{05E8708D-6A20-6218-CABF-51A0C41D9D84}"/>
+              </a:ext>
+            </a:extLst>
+          </p:cNvPr>
+          <p:cNvPicPr>
+            <a:picLocks noChangeAspect="1"/>
+          </p:cNvPicPr>
+          <p:nvPr/>
+        </p:nvPicPr>
+        <p:blipFill>
+          <a:blip r:embed="rId5"/>
+          <a:stretch>
+            <a:fillRect/>
+          </a:stretch>
+        </p:blipFill>
+        <p:spPr>
+          <a:xfrm>
+            <a:off x="6474293" y="3381045"/>
+            <a:ext cx="2892818" cy="2150242"/>
+          </a:xfrm>
+          <a:prstGeom prst="rect">
+            <a:avLst/>
+          </a:prstGeom>
+        </p:spPr>
+      </p:pic>
+    </p:spTree>
+    <p:extLst>
+      <p:ext uri="{BB962C8B-B14F-4D97-AF65-F5344CB8AC3E}">
+        <p14:creationId xmlns:p14="http://schemas.microsoft.com/office/powerpoint/2010/main" val="1287955125"/>
+      </p:ext>
+    </p:extLst>
+  </p:cSld>
+  <p:clrMapOvr>
+    <a:masterClrMapping/>
+  </p:clrMapOvr>
+</p:sld>
+</file>
+
+<file path=ppt/slides/slide4.xml><?xml version="1.0" encoding="utf-8"?>
+<p:sld xmlns:a="http://schemas.openxmlformats.org/drawingml/2006/main" xmlns:r="http://schemas.openxmlformats.org/officeDocument/2006/relationships" xmlns:p="http://schemas.openxmlformats.org/presentationml/2006/main">
+  <p:cSld>
+    <p:spTree>
+      <p:nvGrpSpPr>
+        <p:cNvPr id="1" name=""/>
+        <p:cNvGrpSpPr/>
+        <p:nvPr/>
+      </p:nvGrpSpPr>
+      <p:grpSpPr>
+        <a:xfrm>
+          <a:off x="0" y="0"/>
+          <a:ext cx="0" cy="0"/>
+          <a:chOff x="0" y="0"/>
+          <a:chExt cx="0" cy="0"/>
+        </a:xfrm>
+      </p:grpSpPr>
+      <p:pic>
+        <p:nvPicPr>
+          <p:cNvPr id="3" name="Picture 2">
+            <a:extLst>
+              <a:ext uri="{FF2B5EF4-FFF2-40B4-BE49-F238E27FC236}">
+                <a16:creationId xmlns:a16="http://schemas.microsoft.com/office/drawing/2014/main" id="{DFFE3A5A-55AC-795A-E9A3-6D4968B727C0}"/>
+              </a:ext>
+            </a:extLst>
+          </p:cNvPr>
+          <p:cNvPicPr>
+            <a:picLocks noChangeAspect="1"/>
+          </p:cNvPicPr>
+          <p:nvPr/>
+        </p:nvPicPr>
+        <p:blipFill>
+          <a:blip r:embed="rId2"/>
+          <a:stretch>
+            <a:fillRect/>
+          </a:stretch>
+        </p:blipFill>
+        <p:spPr>
+          <a:xfrm>
+            <a:off x="7174593" y="1840712"/>
+            <a:ext cx="3204275" cy="2798400"/>
+          </a:xfrm>
+          <a:prstGeom prst="rect">
+            <a:avLst/>
+          </a:prstGeom>
+        </p:spPr>
+      </p:pic>
+      <p:sp>
+        <p:nvSpPr>
+          <p:cNvPr id="4" name="TextBox 3">
+            <a:extLst>
+              <a:ext uri="{FF2B5EF4-FFF2-40B4-BE49-F238E27FC236}">
+                <a16:creationId xmlns:a16="http://schemas.microsoft.com/office/drawing/2014/main" id="{403CB135-BC5D-F8C1-527C-52F21DE2923C}"/>
+              </a:ext>
+            </a:extLst>
+          </p:cNvPr>
+          <p:cNvSpPr txBox="1"/>
+          <p:nvPr/>
+        </p:nvSpPr>
+        <p:spPr>
+          <a:xfrm>
+            <a:off x="1019262" y="792760"/>
+            <a:ext cx="10810139" cy="369332"/>
+          </a:xfrm>
+          <a:prstGeom prst="rect">
+            <a:avLst/>
+          </a:prstGeom>
+          <a:noFill/>
+        </p:spPr>
+        <p:txBody>
+          <a:bodyPr wrap="none" rtlCol="0">
+            <a:spAutoFit/>
+          </a:bodyPr>
+          <a:lstStyle/>
+          <a:p>
+            <a:r>
+              <a:rPr lang="en-GB" dirty="0"/>
+              <a:t>Chopper peak around 195meV. Calibration (Tube delays) necessary. Histogram mode, poor energy accuracy</a:t>
+            </a:r>
+          </a:p>
+        </p:txBody>
+      </p:sp>
+      <p:cxnSp>
+        <p:nvCxnSpPr>
+          <p:cNvPr id="11" name="Straight Arrow Connector 10">
+            <a:extLst>
+              <a:ext uri="{FF2B5EF4-FFF2-40B4-BE49-F238E27FC236}">
+                <a16:creationId xmlns:a16="http://schemas.microsoft.com/office/drawing/2014/main" id="{7E5A7F3C-8C8D-B22E-ECC0-B2374B4CA32B}"/>
+              </a:ext>
+            </a:extLst>
+          </p:cNvPr>
+          <p:cNvCxnSpPr>
+            <a:cxnSpLocks/>
+          </p:cNvCxnSpPr>
+          <p:nvPr/>
+        </p:nvCxnSpPr>
+        <p:spPr>
+          <a:xfrm>
+            <a:off x="8882104" y="3299869"/>
+            <a:ext cx="907848" cy="798153"/>
+          </a:xfrm>
+          <a:prstGeom prst="straightConnector1">
+            <a:avLst/>
+          </a:prstGeom>
+          <a:ln>
+            <a:tailEnd type="triangle"/>
+          </a:ln>
+        </p:spPr>
+        <p:style>
+          <a:lnRef idx="2">
+            <a:schemeClr val="accent1"/>
+          </a:lnRef>
+          <a:fillRef idx="0">
+            <a:schemeClr val="accent1"/>
+          </a:fillRef>
+          <a:effectRef idx="1">
+            <a:schemeClr val="accent1"/>
+          </a:effectRef>
+          <a:fontRef idx="minor">
+            <a:schemeClr val="tx1"/>
+          </a:fontRef>
+        </p:style>
+      </p:cxnSp>
+      <p:sp>
+        <p:nvSpPr>
+          <p:cNvPr id="12" name="TextBox 11">
+            <a:extLst>
+              <a:ext uri="{FF2B5EF4-FFF2-40B4-BE49-F238E27FC236}">
+                <a16:creationId xmlns:a16="http://schemas.microsoft.com/office/drawing/2014/main" id="{2257902C-FF66-37F0-4D53-379533B7347A}"/>
+              </a:ext>
+            </a:extLst>
+          </p:cNvPr>
+          <p:cNvSpPr txBox="1"/>
+          <p:nvPr/>
+        </p:nvSpPr>
+        <p:spPr>
+          <a:xfrm>
+            <a:off x="7652638" y="2962504"/>
+            <a:ext cx="2431948" cy="369332"/>
+          </a:xfrm>
+          <a:prstGeom prst="rect">
+            <a:avLst/>
+          </a:prstGeom>
+          <a:noFill/>
+        </p:spPr>
+        <p:txBody>
+          <a:bodyPr wrap="none" rtlCol="0">
+            <a:spAutoFit/>
+          </a:bodyPr>
+          <a:lstStyle/>
+          <a:p>
+            <a:r>
+              <a:rPr lang="en-GB" dirty="0"/>
+              <a:t>Binning range 158 </a:t>
             </a:r>
             <a:r>
               <a:rPr lang="en-GB" dirty="0" err="1"/>
@@ -4388,7 +4795,7 @@
           <a:p>
             <a:r>
               <a:rPr lang="en-GB" dirty="0"/>
-              <a:t>When Ei = 196, </a:t>
+              <a:t>When Ei = 195, </a:t>
             </a:r>
             <a:r>
               <a:rPr lang="en-GB" dirty="0" err="1">
@@ -4406,17 +4813,17 @@
             </a:r>
             <a:r>
               <a:rPr lang="en-GB" dirty="0"/>
-              <a:t> = -0.13</a:t>
+              <a:t> = -0.26</a:t>
             </a:r>
           </a:p>
         </p:txBody>
       </p:sp>
       <p:pic>
         <p:nvPicPr>
-          <p:cNvPr id="14" name="Picture 13">
-            <a:extLst>
-              <a:ext uri="{FF2B5EF4-FFF2-40B4-BE49-F238E27FC236}">
-                <a16:creationId xmlns:a16="http://schemas.microsoft.com/office/drawing/2014/main" id="{7DA88B78-C231-3280-5147-73E0D9524AC4}"/>
+          <p:cNvPr id="5" name="Picture 4">
+            <a:extLst>
+              <a:ext uri="{FF2B5EF4-FFF2-40B4-BE49-F238E27FC236}">
+                <a16:creationId xmlns:a16="http://schemas.microsoft.com/office/drawing/2014/main" id="{6DE0333F-5C95-30D1-312C-3174790A5CEC}"/>
               </a:ext>
             </a:extLst>
           </p:cNvPr>
@@ -4433,8 +4840,8 @@
         </p:blipFill>
         <p:spPr>
           <a:xfrm>
-            <a:off x="6176969" y="5900507"/>
-            <a:ext cx="2838450" cy="695325"/>
+            <a:off x="3986326" y="5908507"/>
+            <a:ext cx="4215415" cy="949493"/>
           </a:xfrm>
           <a:prstGeom prst="rect">
             <a:avLst/>

</xml_diff>